<commit_message>
Re #803 add for Serializable objects
</commit_message>
<xml_diff>
--- a/documentation/Old_documentation/design_forV4/Serializable objects.pptx
+++ b/documentation/Old_documentation/design_forV4/Serializable objects.pptx
@@ -3126,7 +3126,7 @@
         <p:spPr>
           <a:xfrm>
             <a:off x="780450" y="3872073"/>
-            <a:ext cx="7352910" cy="1077218"/>
+            <a:ext cx="6929654" cy="1077218"/>
           </a:xfrm>
           <a:prstGeom prst="rect">
             <a:avLst/>
@@ -3161,7 +3161,7 @@
             </a:pPr>
             <a:r>
               <a:rPr lang="en-GB" dirty="0" smtClean="0"/>
-              <a:t>Public interface (set of properties) allowing to define state of the object</a:t>
+              <a:t>Public interface (set of properties) fully defining a state of the object</a:t>
             </a:r>
             <a:endParaRPr lang="en-GB" dirty="0"/>
           </a:p>
@@ -3504,7 +3504,7 @@
           <a:graphicData uri="http://schemas.openxmlformats.org/presentationml/2006/ole">
             <mc:AlternateContent xmlns:mc="http://schemas.openxmlformats.org/markup-compatibility/2006">
               <mc:Choice xmlns:v="urn:schemas-microsoft-com:vml" Requires="v">
-                <p:oleObj spid="_x0000_s1042" name="Equation" r:id="rId3" imgW="1396800" imgH="914400" progId="Equation.DSMT4">
+                <p:oleObj spid="_x0000_s1044" name="Equation" r:id="rId3" imgW="1396800" imgH="914400" progId="Equation.DSMT4">
                   <p:embed/>
                 </p:oleObj>
               </mc:Choice>
@@ -5065,15 +5065,7 @@
           <a:p>
             <a:r>
               <a:rPr lang="en-GB" dirty="0" smtClean="0"/>
-              <a:t>Serializable </a:t>
-            </a:r>
-            <a:r>
-              <a:rPr lang="en-GB" smtClean="0"/>
-              <a:t>interface specifies </a:t>
-            </a:r>
-            <a:r>
-              <a:rPr lang="en-GB" dirty="0" smtClean="0"/>
-              <a:t>the properties, which fully define the state of the object, so comparing their values gives clear conclusion of the objects equality.</a:t>
+              <a:t>Serializable interface specifies the properties, which fully define the state of the object, so comparing their values gives clear conclusion of the objects equality.</a:t>
             </a:r>
             <a:endParaRPr lang="en-GB" dirty="0"/>
           </a:p>

</xml_diff>